<commit_message>
Completed Dictionary slides, added Linear Regression Notebook
</commit_message>
<xml_diff>
--- a/slides/05 Tuples-Dictionaries.pptx
+++ b/slides/05 Tuples-Dictionaries.pptx
@@ -11,6 +11,12 @@
     <p:sldId id="307" r:id="rId5"/>
     <p:sldId id="308" r:id="rId6"/>
     <p:sldId id="309" r:id="rId7"/>
+    <p:sldId id="310" r:id="rId8"/>
+    <p:sldId id="311" r:id="rId9"/>
+    <p:sldId id="312" r:id="rId10"/>
+    <p:sldId id="315" r:id="rId11"/>
+    <p:sldId id="313" r:id="rId12"/>
+    <p:sldId id="314" r:id="rId13"/>
   </p:sldIdLst>
   <p:sldSz cx="12192000" cy="6858000"/>
   <p:notesSz cx="6858000" cy="9144000"/>
@@ -452,7 +458,7 @@
           <a:p>
             <a:fld id="{9819AC5B-5C28-4682-8A2A-3D2C4E3BE131}" type="datetimeFigureOut">
               <a:rPr lang="en-US" smtClean="0"/>
-              <a:t>7/10/2018</a:t>
+              <a:t>8/14/2018</a:t>
             </a:fld>
             <a:endParaRPr lang="en-US"/>
           </a:p>
@@ -660,7 +666,7 @@
           <a:p>
             <a:fld id="{9819AC5B-5C28-4682-8A2A-3D2C4E3BE131}" type="datetimeFigureOut">
               <a:rPr lang="en-US" smtClean="0"/>
-              <a:t>7/10/2018</a:t>
+              <a:t>8/14/2018</a:t>
             </a:fld>
             <a:endParaRPr lang="en-US"/>
           </a:p>
@@ -1114,7 +1120,7 @@
           <a:p>
             <a:fld id="{9819AC5B-5C28-4682-8A2A-3D2C4E3BE131}" type="datetimeFigureOut">
               <a:rPr lang="en-US" smtClean="0"/>
-              <a:t>7/10/2018</a:t>
+              <a:t>8/14/2018</a:t>
             </a:fld>
             <a:endParaRPr lang="en-US"/>
           </a:p>
@@ -1379,7 +1385,7 @@
           <a:p>
             <a:fld id="{9819AC5B-5C28-4682-8A2A-3D2C4E3BE131}" type="datetimeFigureOut">
               <a:rPr lang="en-US" smtClean="0"/>
-              <a:t>7/10/2018</a:t>
+              <a:t>8/14/2018</a:t>
             </a:fld>
             <a:endParaRPr lang="en-US"/>
           </a:p>
@@ -1791,7 +1797,7 @@
           <a:p>
             <a:fld id="{9819AC5B-5C28-4682-8A2A-3D2C4E3BE131}" type="datetimeFigureOut">
               <a:rPr lang="en-US" smtClean="0"/>
-              <a:t>7/10/2018</a:t>
+              <a:t>8/14/2018</a:t>
             </a:fld>
             <a:endParaRPr lang="en-US"/>
           </a:p>
@@ -1932,7 +1938,7 @@
           <a:p>
             <a:fld id="{9819AC5B-5C28-4682-8A2A-3D2C4E3BE131}" type="datetimeFigureOut">
               <a:rPr lang="en-US" smtClean="0"/>
-              <a:t>7/10/2018</a:t>
+              <a:t>8/14/2018</a:t>
             </a:fld>
             <a:endParaRPr lang="en-US"/>
           </a:p>
@@ -2045,7 +2051,7 @@
           <a:p>
             <a:fld id="{9819AC5B-5C28-4682-8A2A-3D2C4E3BE131}" type="datetimeFigureOut">
               <a:rPr lang="en-US" smtClean="0"/>
-              <a:t>7/10/2018</a:t>
+              <a:t>8/14/2018</a:t>
             </a:fld>
             <a:endParaRPr lang="en-US"/>
           </a:p>
@@ -2356,7 +2362,7 @@
           <a:p>
             <a:fld id="{9819AC5B-5C28-4682-8A2A-3D2C4E3BE131}" type="datetimeFigureOut">
               <a:rPr lang="en-US" smtClean="0"/>
-              <a:t>7/10/2018</a:t>
+              <a:t>8/14/2018</a:t>
             </a:fld>
             <a:endParaRPr lang="en-US"/>
           </a:p>
@@ -2644,7 +2650,7 @@
           <a:p>
             <a:fld id="{9819AC5B-5C28-4682-8A2A-3D2C4E3BE131}" type="datetimeFigureOut">
               <a:rPr lang="en-US" smtClean="0"/>
-              <a:t>7/10/2018</a:t>
+              <a:t>8/14/2018</a:t>
             </a:fld>
             <a:endParaRPr lang="en-US"/>
           </a:p>
@@ -2885,7 +2891,7 @@
           <a:p>
             <a:fld id="{9819AC5B-5C28-4682-8A2A-3D2C4E3BE131}" type="datetimeFigureOut">
               <a:rPr lang="en-US" smtClean="0"/>
-              <a:t>7/10/2018</a:t>
+              <a:t>8/14/2018</a:t>
             </a:fld>
             <a:endParaRPr lang="en-US"/>
           </a:p>
@@ -3406,6 +3412,694 @@
 </p:sld>
 </file>
 
+<file path=ppt/slides/slide10.xml><?xml version="1.0" encoding="utf-8"?>
+<p:sld xmlns:a="http://schemas.openxmlformats.org/drawingml/2006/main" xmlns:r="http://schemas.openxmlformats.org/officeDocument/2006/relationships" xmlns:p="http://schemas.openxmlformats.org/presentationml/2006/main">
+  <p:cSld>
+    <p:spTree>
+      <p:nvGrpSpPr>
+        <p:cNvPr id="1" name=""/>
+        <p:cNvGrpSpPr/>
+        <p:nvPr/>
+      </p:nvGrpSpPr>
+      <p:grpSpPr>
+        <a:xfrm>
+          <a:off x="0" y="0"/>
+          <a:ext cx="0" cy="0"/>
+          <a:chOff x="0" y="0"/>
+          <a:chExt cx="0" cy="0"/>
+        </a:xfrm>
+      </p:grpSpPr>
+      <p:sp>
+        <p:nvSpPr>
+          <p:cNvPr id="2" name="Title 1">
+            <a:extLst>
+              <a:ext uri="{FF2B5EF4-FFF2-40B4-BE49-F238E27FC236}">
+                <a16:creationId xmlns:a16="http://schemas.microsoft.com/office/drawing/2014/main" id="{A3CF88B2-7D10-4512-B991-123D8BB60E9C}"/>
+              </a:ext>
+            </a:extLst>
+          </p:cNvPr>
+          <p:cNvSpPr>
+            <a:spLocks noGrp="1"/>
+          </p:cNvSpPr>
+          <p:nvPr>
+            <p:ph type="title"/>
+          </p:nvPr>
+        </p:nvSpPr>
+        <p:spPr>
+          <a:xfrm>
+            <a:off x="838200" y="365125"/>
+            <a:ext cx="10515600" cy="1325563"/>
+          </a:xfrm>
+        </p:spPr>
+        <p:txBody>
+          <a:bodyPr/>
+          <a:lstStyle/>
+          <a:p>
+            <a:r>
+              <a:rPr lang="en-US" dirty="0"/>
+              <a:t>Dictionaries</a:t>
+            </a:r>
+            <a:endParaRPr lang="en-US" dirty="0">
+              <a:latin typeface="Courier New" panose="02070309020205020404" pitchFamily="49" charset="0"/>
+              <a:cs typeface="Courier New" panose="02070309020205020404" pitchFamily="49" charset="0"/>
+            </a:endParaRPr>
+          </a:p>
+        </p:txBody>
+      </p:sp>
+      <p:sp>
+        <p:nvSpPr>
+          <p:cNvPr id="3" name="Content Placeholder 2">
+            <a:extLst>
+              <a:ext uri="{FF2B5EF4-FFF2-40B4-BE49-F238E27FC236}">
+                <a16:creationId xmlns:a16="http://schemas.microsoft.com/office/drawing/2014/main" id="{5F4835C5-2666-4F19-88FF-ACF2518A749F}"/>
+              </a:ext>
+            </a:extLst>
+          </p:cNvPr>
+          <p:cNvSpPr>
+            <a:spLocks noGrp="1"/>
+          </p:cNvSpPr>
+          <p:nvPr>
+            <p:ph idx="1"/>
+          </p:nvPr>
+        </p:nvSpPr>
+        <p:spPr>
+          <a:xfrm>
+            <a:off x="838199" y="2043739"/>
+            <a:ext cx="10738607" cy="3887278"/>
+          </a:xfrm>
+        </p:spPr>
+        <p:txBody>
+          <a:bodyPr>
+            <a:normAutofit/>
+          </a:bodyPr>
+          <a:lstStyle/>
+          <a:p>
+            <a:pPr marL="0" indent="0">
+              <a:lnSpc>
+                <a:spcPct val="80000"/>
+              </a:lnSpc>
+              <a:buNone/>
+            </a:pPr>
+            <a:r>
+              <a:rPr lang="en-US" altLang="en-US" sz="2300" dirty="0"/>
+              <a:t>Since a dictionary is an </a:t>
+            </a:r>
+            <a:r>
+              <a:rPr lang="en-US" altLang="en-US" sz="2300" i="1" dirty="0" err="1"/>
+              <a:t>iterable</a:t>
+            </a:r>
+            <a:r>
+              <a:rPr lang="en-US" altLang="en-US" sz="2300" dirty="0"/>
+              <a:t> of keys, we can use the ‘in’ operator to check if a key is in the dictionary:</a:t>
+            </a:r>
+          </a:p>
+          <a:p>
+            <a:pPr marL="0" indent="0">
+              <a:lnSpc>
+                <a:spcPct val="80000"/>
+              </a:lnSpc>
+              <a:buNone/>
+            </a:pPr>
+            <a:endParaRPr lang="en-US" altLang="en-US" sz="2300" dirty="0"/>
+          </a:p>
+          <a:p>
+            <a:pPr marL="0" lvl="0" indent="0">
+              <a:lnSpc>
+                <a:spcPct val="100000"/>
+              </a:lnSpc>
+              <a:buNone/>
+            </a:pPr>
+            <a:r>
+              <a:rPr lang="en-US" altLang="en-US" sz="1500" dirty="0">
+                <a:solidFill>
+                  <a:srgbClr val="ED7D31"/>
+                </a:solidFill>
+                <a:latin typeface="Lucida Sans Typewriter" panose="020B0509030504030204" pitchFamily="49" charset="0"/>
+                <a:ea typeface="ＭＳ Ｐゴシック" panose="020B0600070205080204" pitchFamily="34" charset="-128"/>
+              </a:rPr>
+              <a:t>&gt;&gt;&gt; ‘Fine Hall’ in height</a:t>
+            </a:r>
+          </a:p>
+          <a:p>
+            <a:pPr marL="0" lvl="0" indent="0">
+              <a:lnSpc>
+                <a:spcPct val="100000"/>
+              </a:lnSpc>
+              <a:buNone/>
+            </a:pPr>
+            <a:r>
+              <a:rPr lang="en-US" altLang="en-US" sz="1500" dirty="0">
+                <a:solidFill>
+                  <a:srgbClr val="ED7D31"/>
+                </a:solidFill>
+                <a:latin typeface="Lucida Sans Typewriter" panose="020B0509030504030204" pitchFamily="49" charset="0"/>
+                <a:ea typeface="ＭＳ Ｐゴシック" panose="020B0600070205080204" pitchFamily="34" charset="-128"/>
+              </a:rPr>
+              <a:t>False</a:t>
+            </a:r>
+          </a:p>
+          <a:p>
+            <a:pPr marL="0" lvl="0" indent="0">
+              <a:lnSpc>
+                <a:spcPct val="100000"/>
+              </a:lnSpc>
+              <a:buNone/>
+            </a:pPr>
+            <a:endParaRPr lang="en-US" altLang="en-US" sz="1500" dirty="0">
+              <a:solidFill>
+                <a:srgbClr val="ED7D31"/>
+              </a:solidFill>
+              <a:latin typeface="Lucida Sans Typewriter" panose="020B0509030504030204" pitchFamily="49" charset="0"/>
+              <a:ea typeface="ＭＳ Ｐゴシック" panose="020B0600070205080204" pitchFamily="34" charset="-128"/>
+            </a:endParaRPr>
+          </a:p>
+          <a:p>
+            <a:pPr marL="0" lvl="0" indent="0">
+              <a:lnSpc>
+                <a:spcPct val="100000"/>
+              </a:lnSpc>
+              <a:buNone/>
+            </a:pPr>
+            <a:r>
+              <a:rPr lang="en-US" altLang="en-US" sz="2300" dirty="0"/>
+              <a:t>We can be more verbose if needed:</a:t>
+            </a:r>
+          </a:p>
+          <a:p>
+            <a:pPr marL="0" lvl="0" indent="0">
+              <a:lnSpc>
+                <a:spcPct val="100000"/>
+              </a:lnSpc>
+              <a:buNone/>
+            </a:pPr>
+            <a:r>
+              <a:rPr lang="en-US" altLang="en-US" sz="1500" dirty="0">
+                <a:solidFill>
+                  <a:srgbClr val="ED7D31"/>
+                </a:solidFill>
+                <a:latin typeface="Lucida Sans Typewriter" panose="020B0509030504030204" pitchFamily="49" charset="0"/>
+                <a:ea typeface="ＭＳ Ｐゴシック" panose="020B0600070205080204" pitchFamily="34" charset="-128"/>
+              </a:rPr>
+              <a:t>&gt;&gt;&gt; ‘Fine Hall’ in </a:t>
+            </a:r>
+            <a:r>
+              <a:rPr lang="en-US" altLang="en-US" sz="1500" dirty="0" err="1">
+                <a:solidFill>
+                  <a:srgbClr val="ED7D31"/>
+                </a:solidFill>
+                <a:latin typeface="Lucida Sans Typewriter" panose="020B0509030504030204" pitchFamily="49" charset="0"/>
+                <a:ea typeface="ＭＳ Ｐゴシック" panose="020B0600070205080204" pitchFamily="34" charset="-128"/>
+              </a:rPr>
+              <a:t>height.keys</a:t>
+            </a:r>
+            <a:r>
+              <a:rPr lang="en-US" altLang="en-US" sz="1500" dirty="0">
+                <a:solidFill>
+                  <a:srgbClr val="ED7D31"/>
+                </a:solidFill>
+                <a:latin typeface="Lucida Sans Typewriter" panose="020B0509030504030204" pitchFamily="49" charset="0"/>
+                <a:ea typeface="ＭＳ Ｐゴシック" panose="020B0600070205080204" pitchFamily="34" charset="-128"/>
+              </a:rPr>
+              <a:t>()</a:t>
+            </a:r>
+          </a:p>
+          <a:p>
+            <a:pPr marL="0" lvl="0" indent="0">
+              <a:lnSpc>
+                <a:spcPct val="100000"/>
+              </a:lnSpc>
+              <a:buNone/>
+            </a:pPr>
+            <a:r>
+              <a:rPr lang="en-US" altLang="en-US" sz="1500" dirty="0">
+                <a:solidFill>
+                  <a:srgbClr val="ED7D31"/>
+                </a:solidFill>
+                <a:latin typeface="Lucida Sans Typewriter" panose="020B0509030504030204" pitchFamily="49" charset="0"/>
+                <a:ea typeface="ＭＳ Ｐゴシック" panose="020B0600070205080204" pitchFamily="34" charset="-128"/>
+              </a:rPr>
+              <a:t>False</a:t>
+            </a:r>
+          </a:p>
+        </p:txBody>
+      </p:sp>
+    </p:spTree>
+    <p:extLst>
+      <p:ext uri="{BB962C8B-B14F-4D97-AF65-F5344CB8AC3E}">
+        <p14:creationId xmlns:p14="http://schemas.microsoft.com/office/powerpoint/2010/main" val="882072528"/>
+      </p:ext>
+    </p:extLst>
+  </p:cSld>
+  <p:clrMapOvr>
+    <a:masterClrMapping/>
+  </p:clrMapOvr>
+</p:sld>
+</file>
+
+<file path=ppt/slides/slide11.xml><?xml version="1.0" encoding="utf-8"?>
+<p:sld xmlns:a="http://schemas.openxmlformats.org/drawingml/2006/main" xmlns:r="http://schemas.openxmlformats.org/officeDocument/2006/relationships" xmlns:p="http://schemas.openxmlformats.org/presentationml/2006/main">
+  <p:cSld>
+    <p:spTree>
+      <p:nvGrpSpPr>
+        <p:cNvPr id="1" name=""/>
+        <p:cNvGrpSpPr/>
+        <p:nvPr/>
+      </p:nvGrpSpPr>
+      <p:grpSpPr>
+        <a:xfrm>
+          <a:off x="0" y="0"/>
+          <a:ext cx="0" cy="0"/>
+          <a:chOff x="0" y="0"/>
+          <a:chExt cx="0" cy="0"/>
+        </a:xfrm>
+      </p:grpSpPr>
+      <p:sp>
+        <p:nvSpPr>
+          <p:cNvPr id="2" name="Title 1">
+            <a:extLst>
+              <a:ext uri="{FF2B5EF4-FFF2-40B4-BE49-F238E27FC236}">
+                <a16:creationId xmlns:a16="http://schemas.microsoft.com/office/drawing/2014/main" id="{A3CF88B2-7D10-4512-B991-123D8BB60E9C}"/>
+              </a:ext>
+            </a:extLst>
+          </p:cNvPr>
+          <p:cNvSpPr>
+            <a:spLocks noGrp="1"/>
+          </p:cNvSpPr>
+          <p:nvPr>
+            <p:ph type="title"/>
+          </p:nvPr>
+        </p:nvSpPr>
+        <p:spPr>
+          <a:xfrm>
+            <a:off x="838200" y="365125"/>
+            <a:ext cx="10515600" cy="1325563"/>
+          </a:xfrm>
+        </p:spPr>
+        <p:txBody>
+          <a:bodyPr/>
+          <a:lstStyle/>
+          <a:p>
+            <a:r>
+              <a:rPr lang="en-US" dirty="0"/>
+              <a:t>Dictionaries</a:t>
+            </a:r>
+            <a:endParaRPr lang="en-US" dirty="0">
+              <a:latin typeface="Courier New" panose="02070309020205020404" pitchFamily="49" charset="0"/>
+              <a:cs typeface="Courier New" panose="02070309020205020404" pitchFamily="49" charset="0"/>
+            </a:endParaRPr>
+          </a:p>
+        </p:txBody>
+      </p:sp>
+      <p:sp>
+        <p:nvSpPr>
+          <p:cNvPr id="3" name="Content Placeholder 2">
+            <a:extLst>
+              <a:ext uri="{FF2B5EF4-FFF2-40B4-BE49-F238E27FC236}">
+                <a16:creationId xmlns:a16="http://schemas.microsoft.com/office/drawing/2014/main" id="{5F4835C5-2666-4F19-88FF-ACF2518A749F}"/>
+              </a:ext>
+            </a:extLst>
+          </p:cNvPr>
+          <p:cNvSpPr>
+            <a:spLocks noGrp="1"/>
+          </p:cNvSpPr>
+          <p:nvPr>
+            <p:ph idx="1"/>
+          </p:nvPr>
+        </p:nvSpPr>
+        <p:spPr>
+          <a:xfrm>
+            <a:off x="838199" y="2043739"/>
+            <a:ext cx="10738607" cy="3887278"/>
+          </a:xfrm>
+        </p:spPr>
+        <p:txBody>
+          <a:bodyPr>
+            <a:normAutofit fontScale="92500" lnSpcReduction="20000"/>
+          </a:bodyPr>
+          <a:lstStyle/>
+          <a:p>
+            <a:pPr marL="0" indent="0">
+              <a:lnSpc>
+                <a:spcPct val="80000"/>
+              </a:lnSpc>
+              <a:buNone/>
+            </a:pPr>
+            <a:r>
+              <a:rPr lang="en-US" altLang="en-US" sz="2300" dirty="0"/>
+              <a:t>Getting keys/values is so common that we often use </a:t>
+            </a:r>
+            <a:r>
+              <a:rPr lang="en-US" altLang="en-US" sz="2300" i="1" dirty="0"/>
+              <a:t>items() </a:t>
+            </a:r>
+            <a:r>
+              <a:rPr lang="en-US" altLang="en-US" sz="2300" dirty="0"/>
+              <a:t>to get both in parallel</a:t>
+            </a:r>
+          </a:p>
+          <a:p>
+            <a:pPr marL="0" indent="0">
+              <a:lnSpc>
+                <a:spcPct val="80000"/>
+              </a:lnSpc>
+              <a:buNone/>
+            </a:pPr>
+            <a:endParaRPr lang="en-US" altLang="en-US" sz="2300" dirty="0"/>
+          </a:p>
+          <a:p>
+            <a:pPr marL="0" lvl="0" indent="0">
+              <a:lnSpc>
+                <a:spcPct val="100000"/>
+              </a:lnSpc>
+              <a:buNone/>
+            </a:pPr>
+            <a:r>
+              <a:rPr lang="en-US" altLang="en-US" sz="1500" dirty="0">
+                <a:solidFill>
+                  <a:srgbClr val="ED7D31"/>
+                </a:solidFill>
+                <a:latin typeface="Lucida Sans Typewriter" panose="020B0509030504030204" pitchFamily="49" charset="0"/>
+                <a:ea typeface="ＭＳ Ｐゴシック" panose="020B0600070205080204" pitchFamily="34" charset="-128"/>
+              </a:rPr>
+              <a:t>&gt;&gt;&gt; for k, v in </a:t>
+            </a:r>
+            <a:r>
+              <a:rPr lang="en-US" altLang="en-US" sz="1500" dirty="0" err="1">
+                <a:solidFill>
+                  <a:srgbClr val="ED7D31"/>
+                </a:solidFill>
+                <a:latin typeface="Lucida Sans Typewriter" panose="020B0509030504030204" pitchFamily="49" charset="0"/>
+                <a:ea typeface="ＭＳ Ｐゴシック" panose="020B0600070205080204" pitchFamily="34" charset="-128"/>
+              </a:rPr>
+              <a:t>height.items</a:t>
+            </a:r>
+            <a:r>
+              <a:rPr lang="en-US" altLang="en-US" sz="1500" dirty="0">
+                <a:solidFill>
+                  <a:srgbClr val="ED7D31"/>
+                </a:solidFill>
+                <a:latin typeface="Lucida Sans Typewriter" panose="020B0509030504030204" pitchFamily="49" charset="0"/>
+                <a:ea typeface="ＭＳ Ｐゴシック" panose="020B0600070205080204" pitchFamily="34" charset="-128"/>
+              </a:rPr>
+              <a:t>():</a:t>
+            </a:r>
+          </a:p>
+          <a:p>
+            <a:pPr marL="0" lvl="0" indent="0">
+              <a:lnSpc>
+                <a:spcPct val="100000"/>
+              </a:lnSpc>
+              <a:buNone/>
+            </a:pPr>
+            <a:r>
+              <a:rPr lang="en-US" altLang="en-US" sz="1500" dirty="0">
+                <a:solidFill>
+                  <a:srgbClr val="ED7D31"/>
+                </a:solidFill>
+                <a:latin typeface="Lucida Sans Typewriter" panose="020B0509030504030204" pitchFamily="49" charset="0"/>
+                <a:ea typeface="ＭＳ Ｐゴシック" panose="020B0600070205080204" pitchFamily="34" charset="-128"/>
+              </a:rPr>
+              <a:t>...	print(k, v)</a:t>
+            </a:r>
+          </a:p>
+          <a:p>
+            <a:pPr marL="0" lvl="0" indent="0">
+              <a:lnSpc>
+                <a:spcPct val="100000"/>
+              </a:lnSpc>
+              <a:buNone/>
+            </a:pPr>
+            <a:r>
+              <a:rPr lang="en-US" altLang="en-US" sz="1500" dirty="0">
+                <a:solidFill>
+                  <a:srgbClr val="ED7D31"/>
+                </a:solidFill>
+                <a:latin typeface="Lucida Sans Typewriter" panose="020B0509030504030204" pitchFamily="49" charset="0"/>
+                <a:ea typeface="ＭＳ Ｐゴシック" panose="020B0600070205080204" pitchFamily="34" charset="-128"/>
+              </a:rPr>
+              <a:t>Burj Khalifa 828.0</a:t>
+            </a:r>
+          </a:p>
+          <a:p>
+            <a:pPr marL="0" lvl="0" indent="0">
+              <a:lnSpc>
+                <a:spcPct val="100000"/>
+              </a:lnSpc>
+              <a:buNone/>
+            </a:pPr>
+            <a:r>
+              <a:rPr lang="en-US" altLang="en-US" sz="1500" dirty="0">
+                <a:solidFill>
+                  <a:srgbClr val="ED7D31"/>
+                </a:solidFill>
+                <a:latin typeface="Lucida Sans Typewriter" panose="020B0509030504030204" pitchFamily="49" charset="0"/>
+                <a:ea typeface="ＭＳ Ｐゴシック" panose="020B0600070205080204" pitchFamily="34" charset="-128"/>
+              </a:rPr>
+              <a:t>Mercury City Tower 339.0</a:t>
+            </a:r>
+          </a:p>
+          <a:p>
+            <a:pPr marL="0" lvl="0" indent="0">
+              <a:lnSpc>
+                <a:spcPct val="100000"/>
+              </a:lnSpc>
+              <a:buNone/>
+            </a:pPr>
+            <a:r>
+              <a:rPr lang="en-US" altLang="en-US" sz="1500" dirty="0">
+                <a:solidFill>
+                  <a:srgbClr val="ED7D31"/>
+                </a:solidFill>
+                <a:latin typeface="Lucida Sans Typewriter" panose="020B0509030504030204" pitchFamily="49" charset="0"/>
+                <a:ea typeface="ＭＳ Ｐゴシック" panose="020B0600070205080204" pitchFamily="34" charset="-128"/>
+              </a:rPr>
+              <a:t>Empire State Building 381.0</a:t>
+            </a:r>
+          </a:p>
+          <a:p>
+            <a:pPr marL="0" lvl="0" indent="0">
+              <a:lnSpc>
+                <a:spcPct val="100000"/>
+              </a:lnSpc>
+              <a:buNone/>
+            </a:pPr>
+            <a:r>
+              <a:rPr lang="en-US" altLang="en-US" sz="1500" dirty="0">
+                <a:solidFill>
+                  <a:srgbClr val="ED7D31"/>
+                </a:solidFill>
+                <a:latin typeface="Lucida Sans Typewriter" panose="020B0509030504030204" pitchFamily="49" charset="0"/>
+                <a:ea typeface="ＭＳ Ｐゴシック" panose="020B0600070205080204" pitchFamily="34" charset="-128"/>
+              </a:rPr>
+              <a:t>One World Trade Center 541.3</a:t>
+            </a:r>
+          </a:p>
+          <a:p>
+            <a:pPr marL="0" lvl="0" indent="0">
+              <a:lnSpc>
+                <a:spcPct val="100000"/>
+              </a:lnSpc>
+              <a:buNone/>
+            </a:pPr>
+            <a:endParaRPr lang="en-US" altLang="en-US" sz="1500" dirty="0">
+              <a:solidFill>
+                <a:srgbClr val="ED7D31"/>
+              </a:solidFill>
+              <a:latin typeface="Lucida Sans Typewriter" panose="020B0509030504030204" pitchFamily="49" charset="0"/>
+              <a:ea typeface="ＭＳ Ｐゴシック" panose="020B0600070205080204" pitchFamily="34" charset="-128"/>
+            </a:endParaRPr>
+          </a:p>
+          <a:p>
+            <a:pPr marL="0" lvl="0" indent="0">
+              <a:lnSpc>
+                <a:spcPct val="100000"/>
+              </a:lnSpc>
+              <a:buNone/>
+            </a:pPr>
+            <a:r>
+              <a:rPr lang="en-US" altLang="en-US" sz="2300" dirty="0"/>
+              <a:t>Let’s get our terminology right:</a:t>
+            </a:r>
+          </a:p>
+          <a:p>
+            <a:pPr marL="0" lvl="0" indent="0">
+              <a:lnSpc>
+                <a:spcPct val="100000"/>
+              </a:lnSpc>
+              <a:buNone/>
+            </a:pPr>
+            <a:r>
+              <a:rPr lang="en-US" altLang="en-US" sz="2300" dirty="0"/>
+              <a:t>keys() is a dictionary </a:t>
+            </a:r>
+            <a:r>
+              <a:rPr lang="en-US" altLang="en-US" sz="2300" i="1" dirty="0"/>
+              <a:t>method</a:t>
+            </a:r>
+            <a:r>
+              <a:rPr lang="en-US" altLang="en-US" sz="2300" dirty="0"/>
+              <a:t> that returns an </a:t>
+            </a:r>
+            <a:r>
+              <a:rPr lang="en-US" altLang="en-US" sz="2300" i="1" dirty="0" err="1"/>
+              <a:t>iterable</a:t>
+            </a:r>
+            <a:r>
+              <a:rPr lang="en-US" altLang="en-US" sz="2300" dirty="0"/>
+              <a:t> of objects (keys)</a:t>
+            </a:r>
+          </a:p>
+          <a:p>
+            <a:pPr marL="0" lvl="0" indent="0">
+              <a:lnSpc>
+                <a:spcPct val="100000"/>
+              </a:lnSpc>
+              <a:buNone/>
+            </a:pPr>
+            <a:r>
+              <a:rPr lang="en-US" altLang="en-US" sz="2300" dirty="0"/>
+              <a:t>items() is a dictionary </a:t>
+            </a:r>
+            <a:r>
+              <a:rPr lang="en-US" altLang="en-US" sz="2300" i="1" dirty="0"/>
+              <a:t>method</a:t>
+            </a:r>
+            <a:r>
+              <a:rPr lang="en-US" altLang="en-US" sz="2300" dirty="0"/>
+              <a:t> that returns an </a:t>
+            </a:r>
+            <a:r>
+              <a:rPr lang="en-US" altLang="en-US" sz="2300" i="1" dirty="0" err="1"/>
+              <a:t>iterable</a:t>
+            </a:r>
+            <a:r>
+              <a:rPr lang="en-US" altLang="en-US" sz="2300" dirty="0"/>
+              <a:t> of 2-tuples (key-value pairs).</a:t>
+            </a:r>
+          </a:p>
+        </p:txBody>
+      </p:sp>
+    </p:spTree>
+    <p:extLst>
+      <p:ext uri="{BB962C8B-B14F-4D97-AF65-F5344CB8AC3E}">
+        <p14:creationId xmlns:p14="http://schemas.microsoft.com/office/powerpoint/2010/main" val="470092715"/>
+      </p:ext>
+    </p:extLst>
+  </p:cSld>
+  <p:clrMapOvr>
+    <a:masterClrMapping/>
+  </p:clrMapOvr>
+</p:sld>
+</file>
+
+<file path=ppt/slides/slide12.xml><?xml version="1.0" encoding="utf-8"?>
+<p:sld xmlns:a="http://schemas.openxmlformats.org/drawingml/2006/main" xmlns:r="http://schemas.openxmlformats.org/officeDocument/2006/relationships" xmlns:p="http://schemas.openxmlformats.org/presentationml/2006/main">
+  <p:cSld>
+    <p:spTree>
+      <p:nvGrpSpPr>
+        <p:cNvPr id="1" name=""/>
+        <p:cNvGrpSpPr/>
+        <p:nvPr/>
+      </p:nvGrpSpPr>
+      <p:grpSpPr>
+        <a:xfrm>
+          <a:off x="0" y="0"/>
+          <a:ext cx="0" cy="0"/>
+          <a:chOff x="0" y="0"/>
+          <a:chExt cx="0" cy="0"/>
+        </a:xfrm>
+      </p:grpSpPr>
+      <p:sp>
+        <p:nvSpPr>
+          <p:cNvPr id="2" name="Title 1">
+            <a:extLst>
+              <a:ext uri="{FF2B5EF4-FFF2-40B4-BE49-F238E27FC236}">
+                <a16:creationId xmlns:a16="http://schemas.microsoft.com/office/drawing/2014/main" id="{A3CF88B2-7D10-4512-B991-123D8BB60E9C}"/>
+              </a:ext>
+            </a:extLst>
+          </p:cNvPr>
+          <p:cNvSpPr>
+            <a:spLocks noGrp="1"/>
+          </p:cNvSpPr>
+          <p:nvPr>
+            <p:ph type="title"/>
+          </p:nvPr>
+        </p:nvSpPr>
+        <p:spPr>
+          <a:xfrm>
+            <a:off x="838200" y="365125"/>
+            <a:ext cx="10515600" cy="1325563"/>
+          </a:xfrm>
+        </p:spPr>
+        <p:txBody>
+          <a:bodyPr/>
+          <a:lstStyle/>
+          <a:p>
+            <a:r>
+              <a:rPr lang="en-US" dirty="0"/>
+              <a:t>Dictionaries</a:t>
+            </a:r>
+            <a:endParaRPr lang="en-US" dirty="0">
+              <a:latin typeface="Courier New" panose="02070309020205020404" pitchFamily="49" charset="0"/>
+              <a:cs typeface="Courier New" panose="02070309020205020404" pitchFamily="49" charset="0"/>
+            </a:endParaRPr>
+          </a:p>
+        </p:txBody>
+      </p:sp>
+      <p:sp>
+        <p:nvSpPr>
+          <p:cNvPr id="3" name="Content Placeholder 2">
+            <a:extLst>
+              <a:ext uri="{FF2B5EF4-FFF2-40B4-BE49-F238E27FC236}">
+                <a16:creationId xmlns:a16="http://schemas.microsoft.com/office/drawing/2014/main" id="{5F4835C5-2666-4F19-88FF-ACF2518A749F}"/>
+              </a:ext>
+            </a:extLst>
+          </p:cNvPr>
+          <p:cNvSpPr>
+            <a:spLocks noGrp="1"/>
+          </p:cNvSpPr>
+          <p:nvPr>
+            <p:ph idx="1"/>
+          </p:nvPr>
+        </p:nvSpPr>
+        <p:spPr>
+          <a:xfrm>
+            <a:off x="838199" y="2043739"/>
+            <a:ext cx="10738607" cy="3887278"/>
+          </a:xfrm>
+        </p:spPr>
+        <p:txBody>
+          <a:bodyPr>
+            <a:normAutofit/>
+          </a:bodyPr>
+          <a:lstStyle/>
+          <a:p>
+            <a:pPr marL="0" indent="0">
+              <a:lnSpc>
+                <a:spcPct val="80000"/>
+              </a:lnSpc>
+              <a:buNone/>
+            </a:pPr>
+            <a:r>
+              <a:rPr lang="en-US" altLang="en-US" sz="2300" dirty="0"/>
+              <a:t>Exercise 1</a:t>
+            </a:r>
+          </a:p>
+        </p:txBody>
+      </p:sp>
+    </p:spTree>
+    <p:extLst>
+      <p:ext uri="{BB962C8B-B14F-4D97-AF65-F5344CB8AC3E}">
+        <p14:creationId xmlns:p14="http://schemas.microsoft.com/office/powerpoint/2010/main" val="1858465551"/>
+      </p:ext>
+    </p:extLst>
+  </p:cSld>
+  <p:clrMapOvr>
+    <a:masterClrMapping/>
+  </p:clrMapOvr>
+</p:sld>
+</file>
+
 <file path=ppt/slides/slide2.xml><?xml version="1.0" encoding="utf-8"?>
 <p:sld xmlns:a="http://schemas.openxmlformats.org/drawingml/2006/main" xmlns:r="http://schemas.openxmlformats.org/officeDocument/2006/relationships" xmlns:p="http://schemas.openxmlformats.org/presentationml/2006/main">
   <p:cSld>
@@ -4494,7 +5188,7 @@
         </p:spPr>
         <p:txBody>
           <a:bodyPr>
-            <a:normAutofit/>
+            <a:normAutofit lnSpcReduction="10000"/>
           </a:bodyPr>
           <a:lstStyle/>
           <a:p>
@@ -4506,15 +5200,1170 @@
             </a:pPr>
             <a:r>
               <a:rPr lang="en-US" altLang="en-US" sz="2300" dirty="0"/>
-              <a:t>Coming Soon..</a:t>
-            </a:r>
-          </a:p>
-        </p:txBody>
-      </p:sp>
+              <a:t>An </a:t>
+            </a:r>
+            <a:r>
+              <a:rPr lang="en-US" altLang="en-US" sz="2300" i="1" dirty="0"/>
+              <a:t>Associate Array </a:t>
+            </a:r>
+            <a:r>
+              <a:rPr lang="en-US" altLang="en-US" sz="2300" dirty="0"/>
+              <a:t>or a </a:t>
+            </a:r>
+            <a:r>
+              <a:rPr lang="en-US" altLang="en-US" sz="2300" i="1" dirty="0"/>
+              <a:t>Hash.</a:t>
+            </a:r>
+          </a:p>
+          <a:p>
+            <a:pPr marL="0" indent="0">
+              <a:lnSpc>
+                <a:spcPct val="80000"/>
+              </a:lnSpc>
+              <a:buNone/>
+            </a:pPr>
+            <a:endParaRPr lang="en-US" altLang="en-US" sz="2300" i="1" dirty="0"/>
+          </a:p>
+          <a:p>
+            <a:pPr marL="0" indent="0">
+              <a:lnSpc>
+                <a:spcPct val="80000"/>
+              </a:lnSpc>
+              <a:buNone/>
+            </a:pPr>
+            <a:r>
+              <a:rPr lang="en-US" altLang="en-US" sz="2300" dirty="0"/>
+              <a:t>A Dictionary exists as Key-Value pairs, which do not have any particular order. A </a:t>
+            </a:r>
+            <a:r>
+              <a:rPr lang="en-US" altLang="en-US" sz="2300" i="1" dirty="0"/>
+              <a:t>key</a:t>
+            </a:r>
+            <a:r>
+              <a:rPr lang="en-US" altLang="en-US" sz="2300" dirty="0"/>
+              <a:t> is any </a:t>
+            </a:r>
+            <a:r>
+              <a:rPr lang="en-US" altLang="en-US" sz="2300" i="1" dirty="0"/>
+              <a:t>immutable</a:t>
+            </a:r>
+            <a:r>
+              <a:rPr lang="en-US" altLang="en-US" sz="2300" dirty="0"/>
+              <a:t> object, and the </a:t>
+            </a:r>
+            <a:r>
+              <a:rPr lang="en-US" altLang="en-US" sz="2300" i="1" dirty="0"/>
+              <a:t>value</a:t>
+            </a:r>
+            <a:r>
+              <a:rPr lang="en-US" altLang="en-US" sz="2300" dirty="0"/>
+              <a:t> is any object.</a:t>
+            </a:r>
+          </a:p>
+          <a:p>
+            <a:pPr marL="0" indent="0">
+              <a:lnSpc>
+                <a:spcPct val="80000"/>
+              </a:lnSpc>
+              <a:buNone/>
+            </a:pPr>
+            <a:endParaRPr lang="en-US" altLang="en-US" sz="2300" dirty="0"/>
+          </a:p>
+          <a:p>
+            <a:pPr marL="0" indent="0">
+              <a:lnSpc>
+                <a:spcPct val="80000"/>
+              </a:lnSpc>
+              <a:buNone/>
+            </a:pPr>
+            <a:r>
+              <a:rPr lang="en-US" altLang="en-US" sz="2300" dirty="0"/>
+              <a:t>A dictionary itself is </a:t>
+            </a:r>
+            <a:r>
+              <a:rPr lang="en-US" altLang="en-US" sz="2300" i="1" dirty="0"/>
+              <a:t>mutable</a:t>
+            </a:r>
+            <a:r>
+              <a:rPr lang="en-US" altLang="en-US" sz="2300" dirty="0"/>
+              <a:t>.</a:t>
+            </a:r>
+          </a:p>
+          <a:p>
+            <a:pPr marL="0" indent="0">
+              <a:lnSpc>
+                <a:spcPct val="80000"/>
+              </a:lnSpc>
+              <a:buNone/>
+            </a:pPr>
+            <a:endParaRPr lang="en-US" altLang="en-US" sz="2300" dirty="0"/>
+          </a:p>
+          <a:p>
+            <a:pPr marL="0" lvl="0" indent="0">
+              <a:lnSpc>
+                <a:spcPct val="100000"/>
+              </a:lnSpc>
+              <a:buNone/>
+            </a:pPr>
+            <a:r>
+              <a:rPr lang="en-US" altLang="en-US" sz="1500" dirty="0">
+                <a:solidFill>
+                  <a:srgbClr val="ED7D31"/>
+                </a:solidFill>
+                <a:latin typeface="Lucida Sans Typewriter" panose="020B0509030504030204" pitchFamily="49" charset="0"/>
+                <a:ea typeface="ＭＳ Ｐゴシック" panose="020B0600070205080204" pitchFamily="34" charset="-128"/>
+              </a:rPr>
+              <a:t>&gt;&gt;&gt; height = {‘Burj Khalifa’: 828., ‘Mercury City Tower’: -1, ‘One World Trade Center’: 541.3, ‘Mercury City Tower’: 339.}</a:t>
+            </a:r>
+          </a:p>
+          <a:p>
+            <a:pPr marL="0" lvl="0" indent="0">
+              <a:lnSpc>
+                <a:spcPct val="100000"/>
+              </a:lnSpc>
+              <a:buNone/>
+            </a:pPr>
+            <a:r>
+              <a:rPr lang="en-US" altLang="en-US" sz="1500" dirty="0">
+                <a:solidFill>
+                  <a:srgbClr val="ED7D31"/>
+                </a:solidFill>
+                <a:latin typeface="Lucida Sans Typewriter" panose="020B0509030504030204" pitchFamily="49" charset="0"/>
+                <a:ea typeface="ＭＳ Ｐゴシック" panose="020B0600070205080204" pitchFamily="34" charset="-128"/>
+              </a:rPr>
+              <a:t>&gt;&gt;&gt; height</a:t>
+            </a:r>
+          </a:p>
+          <a:p>
+            <a:pPr marL="0" lvl="0" indent="0">
+              <a:lnSpc>
+                <a:spcPct val="100000"/>
+              </a:lnSpc>
+              <a:buNone/>
+            </a:pPr>
+            <a:r>
+              <a:rPr lang="en-US" altLang="en-US" sz="1500" dirty="0">
+                <a:solidFill>
+                  <a:srgbClr val="ED7D31"/>
+                </a:solidFill>
+                <a:latin typeface="Lucida Sans Typewriter" panose="020B0509030504030204" pitchFamily="49" charset="0"/>
+                <a:ea typeface="ＭＳ Ｐゴシック" panose="020B0600070205080204" pitchFamily="34" charset="-128"/>
+              </a:rPr>
+              <a:t>&gt;&gt;&gt; {'Mercury City Tower': 339.0, 'One World Trade Center': 541.3, 'Burj Khalifa': 828.0}</a:t>
+            </a:r>
+          </a:p>
+          <a:p>
+            <a:pPr marL="0" indent="0">
+              <a:lnSpc>
+                <a:spcPct val="80000"/>
+              </a:lnSpc>
+              <a:buNone/>
+            </a:pPr>
+            <a:endParaRPr lang="en-US" altLang="en-US" sz="2300" dirty="0"/>
+          </a:p>
+        </p:txBody>
+      </p:sp>
+      <p:sp>
+        <p:nvSpPr>
+          <p:cNvPr id="4" name="TextBox 3">
+            <a:extLst>
+              <a:ext uri="{FF2B5EF4-FFF2-40B4-BE49-F238E27FC236}">
+                <a16:creationId xmlns:a16="http://schemas.microsoft.com/office/drawing/2014/main" id="{13B4E057-14CE-4029-8511-C293BD1C4CA6}"/>
+              </a:ext>
+            </a:extLst>
+          </p:cNvPr>
+          <p:cNvSpPr txBox="1"/>
+          <p:nvPr/>
+        </p:nvSpPr>
+        <p:spPr>
+          <a:xfrm>
+            <a:off x="7463564" y="5876711"/>
+            <a:ext cx="4113241" cy="461665"/>
+          </a:xfrm>
+          <a:prstGeom prst="rect">
+            <a:avLst/>
+          </a:prstGeom>
+          <a:noFill/>
+          <a:ln>
+            <a:solidFill>
+              <a:schemeClr val="accent1"/>
+            </a:solidFill>
+          </a:ln>
+        </p:spPr>
+        <p:txBody>
+          <a:bodyPr wrap="square" rtlCol="0">
+            <a:spAutoFit/>
+          </a:bodyPr>
+          <a:lstStyle/>
+          <a:p>
+            <a:r>
+              <a:rPr lang="en-US" sz="2400" dirty="0"/>
+              <a:t>Order changed, only 3 keys.</a:t>
+            </a:r>
+          </a:p>
+        </p:txBody>
+      </p:sp>
+      <p:cxnSp>
+        <p:nvCxnSpPr>
+          <p:cNvPr id="5" name="Straight Arrow Connector 4">
+            <a:extLst>
+              <a:ext uri="{FF2B5EF4-FFF2-40B4-BE49-F238E27FC236}">
+                <a16:creationId xmlns:a16="http://schemas.microsoft.com/office/drawing/2014/main" id="{00DE8EAB-619F-42B7-BFD4-33D4FF9B0F2E}"/>
+              </a:ext>
+            </a:extLst>
+          </p:cNvPr>
+          <p:cNvCxnSpPr>
+            <a:cxnSpLocks/>
+            <a:stCxn id="4" idx="1"/>
+          </p:cNvCxnSpPr>
+          <p:nvPr/>
+        </p:nvCxnSpPr>
+        <p:spPr>
+          <a:xfrm flipH="1" flipV="1">
+            <a:off x="5924939" y="5876711"/>
+            <a:ext cx="1538625" cy="230833"/>
+          </a:xfrm>
+          <a:prstGeom prst="straightConnector1">
+            <a:avLst/>
+          </a:prstGeom>
+          <a:ln>
+            <a:tailEnd type="triangle"/>
+          </a:ln>
+        </p:spPr>
+        <p:style>
+          <a:lnRef idx="1">
+            <a:schemeClr val="accent1"/>
+          </a:lnRef>
+          <a:fillRef idx="0">
+            <a:schemeClr val="accent1"/>
+          </a:fillRef>
+          <a:effectRef idx="0">
+            <a:schemeClr val="accent1"/>
+          </a:effectRef>
+          <a:fontRef idx="minor">
+            <a:schemeClr val="tx1"/>
+          </a:fontRef>
+        </p:style>
+      </p:cxnSp>
     </p:spTree>
     <p:extLst>
       <p:ext uri="{BB962C8B-B14F-4D97-AF65-F5344CB8AC3E}">
         <p14:creationId xmlns:p14="http://schemas.microsoft.com/office/powerpoint/2010/main" val="2501437640"/>
+      </p:ext>
+    </p:extLst>
+  </p:cSld>
+  <p:clrMapOvr>
+    <a:masterClrMapping/>
+  </p:clrMapOvr>
+</p:sld>
+</file>
+
+<file path=ppt/slides/slide7.xml><?xml version="1.0" encoding="utf-8"?>
+<p:sld xmlns:a="http://schemas.openxmlformats.org/drawingml/2006/main" xmlns:r="http://schemas.openxmlformats.org/officeDocument/2006/relationships" xmlns:p="http://schemas.openxmlformats.org/presentationml/2006/main">
+  <p:cSld>
+    <p:spTree>
+      <p:nvGrpSpPr>
+        <p:cNvPr id="1" name=""/>
+        <p:cNvGrpSpPr/>
+        <p:nvPr/>
+      </p:nvGrpSpPr>
+      <p:grpSpPr>
+        <a:xfrm>
+          <a:off x="0" y="0"/>
+          <a:ext cx="0" cy="0"/>
+          <a:chOff x="0" y="0"/>
+          <a:chExt cx="0" cy="0"/>
+        </a:xfrm>
+      </p:grpSpPr>
+      <p:sp>
+        <p:nvSpPr>
+          <p:cNvPr id="2" name="Title 1">
+            <a:extLst>
+              <a:ext uri="{FF2B5EF4-FFF2-40B4-BE49-F238E27FC236}">
+                <a16:creationId xmlns:a16="http://schemas.microsoft.com/office/drawing/2014/main" id="{A3CF88B2-7D10-4512-B991-123D8BB60E9C}"/>
+              </a:ext>
+            </a:extLst>
+          </p:cNvPr>
+          <p:cNvSpPr>
+            <a:spLocks noGrp="1"/>
+          </p:cNvSpPr>
+          <p:nvPr>
+            <p:ph type="title"/>
+          </p:nvPr>
+        </p:nvSpPr>
+        <p:spPr>
+          <a:xfrm>
+            <a:off x="838200" y="365125"/>
+            <a:ext cx="10515600" cy="1325563"/>
+          </a:xfrm>
+        </p:spPr>
+        <p:txBody>
+          <a:bodyPr/>
+          <a:lstStyle/>
+          <a:p>
+            <a:r>
+              <a:rPr lang="en-US" dirty="0"/>
+              <a:t>Dictionaries</a:t>
+            </a:r>
+            <a:endParaRPr lang="en-US" dirty="0">
+              <a:latin typeface="Courier New" panose="02070309020205020404" pitchFamily="49" charset="0"/>
+              <a:cs typeface="Courier New" panose="02070309020205020404" pitchFamily="49" charset="0"/>
+            </a:endParaRPr>
+          </a:p>
+        </p:txBody>
+      </p:sp>
+      <p:sp>
+        <p:nvSpPr>
+          <p:cNvPr id="3" name="Content Placeholder 2">
+            <a:extLst>
+              <a:ext uri="{FF2B5EF4-FFF2-40B4-BE49-F238E27FC236}">
+                <a16:creationId xmlns:a16="http://schemas.microsoft.com/office/drawing/2014/main" id="{5F4835C5-2666-4F19-88FF-ACF2518A749F}"/>
+              </a:ext>
+            </a:extLst>
+          </p:cNvPr>
+          <p:cNvSpPr>
+            <a:spLocks noGrp="1"/>
+          </p:cNvSpPr>
+          <p:nvPr>
+            <p:ph idx="1"/>
+          </p:nvPr>
+        </p:nvSpPr>
+        <p:spPr>
+          <a:xfrm>
+            <a:off x="838199" y="2043739"/>
+            <a:ext cx="10738607" cy="3887278"/>
+          </a:xfrm>
+        </p:spPr>
+        <p:txBody>
+          <a:bodyPr>
+            <a:normAutofit fontScale="85000" lnSpcReduction="20000"/>
+          </a:bodyPr>
+          <a:lstStyle/>
+          <a:p>
+            <a:pPr marL="0" indent="0">
+              <a:lnSpc>
+                <a:spcPct val="80000"/>
+              </a:lnSpc>
+              <a:buNone/>
+            </a:pPr>
+            <a:r>
+              <a:rPr lang="en-US" altLang="en-US" sz="2300" dirty="0"/>
+              <a:t>New items can be added on the fly:</a:t>
+            </a:r>
+          </a:p>
+          <a:p>
+            <a:pPr marL="0" indent="0">
+              <a:lnSpc>
+                <a:spcPct val="80000"/>
+              </a:lnSpc>
+              <a:buNone/>
+            </a:pPr>
+            <a:endParaRPr lang="en-US" altLang="en-US" sz="2300" dirty="0"/>
+          </a:p>
+          <a:p>
+            <a:pPr marL="0" lvl="0" indent="0">
+              <a:lnSpc>
+                <a:spcPct val="100000"/>
+              </a:lnSpc>
+              <a:buNone/>
+            </a:pPr>
+            <a:r>
+              <a:rPr lang="en-US" altLang="en-US" sz="1500" dirty="0">
+                <a:solidFill>
+                  <a:srgbClr val="ED7D31"/>
+                </a:solidFill>
+                <a:latin typeface="Lucida Sans Typewriter" panose="020B0509030504030204" pitchFamily="49" charset="0"/>
+                <a:ea typeface="ＭＳ Ｐゴシック" panose="020B0600070205080204" pitchFamily="34" charset="-128"/>
+              </a:rPr>
+              <a:t>&gt;&gt;&gt; height[‘Empire State Building’] = 381.</a:t>
+            </a:r>
+          </a:p>
+          <a:p>
+            <a:pPr marL="0" lvl="0" indent="0">
+              <a:lnSpc>
+                <a:spcPct val="100000"/>
+              </a:lnSpc>
+              <a:buNone/>
+            </a:pPr>
+            <a:r>
+              <a:rPr lang="en-US" altLang="en-US" sz="1500" dirty="0">
+                <a:solidFill>
+                  <a:srgbClr val="ED7D31"/>
+                </a:solidFill>
+                <a:latin typeface="Lucida Sans Typewriter" panose="020B0509030504030204" pitchFamily="49" charset="0"/>
+                <a:ea typeface="ＭＳ Ｐゴシック" panose="020B0600070205080204" pitchFamily="34" charset="-128"/>
+              </a:rPr>
+              <a:t>&gt;&gt;&gt; building = ‘Empire State Building’</a:t>
+            </a:r>
+          </a:p>
+          <a:p>
+            <a:pPr marL="0" lvl="0" indent="0">
+              <a:lnSpc>
+                <a:spcPct val="100000"/>
+              </a:lnSpc>
+              <a:buNone/>
+            </a:pPr>
+            <a:r>
+              <a:rPr lang="en-US" altLang="en-US" sz="1500" dirty="0">
+                <a:solidFill>
+                  <a:srgbClr val="ED7D31"/>
+                </a:solidFill>
+                <a:latin typeface="Lucida Sans Typewriter" panose="020B0509030504030204" pitchFamily="49" charset="0"/>
+                <a:ea typeface="ＭＳ Ｐゴシック" panose="020B0600070205080204" pitchFamily="34" charset="-128"/>
+              </a:rPr>
+              <a:t>&gt;&gt;&gt; height[building]</a:t>
+            </a:r>
+          </a:p>
+          <a:p>
+            <a:pPr marL="0" lvl="0" indent="0">
+              <a:lnSpc>
+                <a:spcPct val="100000"/>
+              </a:lnSpc>
+              <a:buNone/>
+            </a:pPr>
+            <a:r>
+              <a:rPr lang="en-US" altLang="en-US" sz="1500" dirty="0">
+                <a:solidFill>
+                  <a:srgbClr val="ED7D31"/>
+                </a:solidFill>
+                <a:latin typeface="Lucida Sans Typewriter" panose="020B0509030504030204" pitchFamily="49" charset="0"/>
+                <a:ea typeface="ＭＳ Ｐゴシック" panose="020B0600070205080204" pitchFamily="34" charset="-128"/>
+              </a:rPr>
+              <a:t>381.</a:t>
+            </a:r>
+          </a:p>
+          <a:p>
+            <a:pPr marL="0" lvl="0" indent="0">
+              <a:lnSpc>
+                <a:spcPct val="100000"/>
+              </a:lnSpc>
+              <a:buNone/>
+            </a:pPr>
+            <a:endParaRPr lang="en-US" altLang="en-US" sz="1500" dirty="0">
+              <a:solidFill>
+                <a:srgbClr val="ED7D31"/>
+              </a:solidFill>
+              <a:latin typeface="Lucida Sans Typewriter" panose="020B0509030504030204" pitchFamily="49" charset="0"/>
+              <a:ea typeface="ＭＳ Ｐゴシック" panose="020B0600070205080204" pitchFamily="34" charset="-128"/>
+            </a:endParaRPr>
+          </a:p>
+          <a:p>
+            <a:pPr marL="0" lvl="0" indent="0">
+              <a:lnSpc>
+                <a:spcPct val="100000"/>
+              </a:lnSpc>
+              <a:buNone/>
+            </a:pPr>
+            <a:r>
+              <a:rPr lang="en-US" altLang="en-US" sz="1500" dirty="0">
+                <a:solidFill>
+                  <a:srgbClr val="ED7D31"/>
+                </a:solidFill>
+                <a:latin typeface="Lucida Sans Typewriter" panose="020B0509030504030204" pitchFamily="49" charset="0"/>
+                <a:ea typeface="ＭＳ Ｐゴシック" panose="020B0600070205080204" pitchFamily="34" charset="-128"/>
+              </a:rPr>
+              <a:t>&gt;&gt;&gt; height[‘Sears Tower’]</a:t>
+            </a:r>
+          </a:p>
+          <a:p>
+            <a:pPr marL="0" indent="0">
+              <a:lnSpc>
+                <a:spcPct val="80000"/>
+              </a:lnSpc>
+              <a:buNone/>
+            </a:pPr>
+            <a:r>
+              <a:rPr lang="en-US" altLang="en-US" sz="1500" dirty="0">
+                <a:solidFill>
+                  <a:srgbClr val="ED7D31"/>
+                </a:solidFill>
+                <a:latin typeface="Lucida Sans Typewriter" panose="020B0509030504030204" pitchFamily="49" charset="0"/>
+                <a:ea typeface="ＭＳ Ｐゴシック" panose="020B0600070205080204" pitchFamily="34" charset="-128"/>
+              </a:rPr>
+              <a:t>Traceback (most recent call last):</a:t>
+            </a:r>
+          </a:p>
+          <a:p>
+            <a:pPr marL="0" indent="0">
+              <a:lnSpc>
+                <a:spcPct val="80000"/>
+              </a:lnSpc>
+              <a:buNone/>
+            </a:pPr>
+            <a:r>
+              <a:rPr lang="en-US" altLang="en-US" sz="1500" dirty="0">
+                <a:solidFill>
+                  <a:srgbClr val="ED7D31"/>
+                </a:solidFill>
+                <a:latin typeface="Lucida Sans Typewriter" panose="020B0509030504030204" pitchFamily="49" charset="0"/>
+                <a:ea typeface="ＭＳ Ｐゴシック" panose="020B0600070205080204" pitchFamily="34" charset="-128"/>
+              </a:rPr>
+              <a:t>  File "&lt;stdin&gt;", line 1, in &lt;module&gt;</a:t>
+            </a:r>
+          </a:p>
+          <a:p>
+            <a:pPr marL="0" indent="0">
+              <a:lnSpc>
+                <a:spcPct val="80000"/>
+              </a:lnSpc>
+              <a:buNone/>
+            </a:pPr>
+            <a:r>
+              <a:rPr lang="en-US" altLang="en-US" sz="1500" dirty="0" err="1">
+                <a:solidFill>
+                  <a:srgbClr val="ED7D31"/>
+                </a:solidFill>
+                <a:latin typeface="Lucida Sans Typewriter" panose="020B0509030504030204" pitchFamily="49" charset="0"/>
+                <a:ea typeface="ＭＳ Ｐゴシック" panose="020B0600070205080204" pitchFamily="34" charset="-128"/>
+              </a:rPr>
+              <a:t>KeyError</a:t>
+            </a:r>
+            <a:r>
+              <a:rPr lang="en-US" altLang="en-US" sz="1500" dirty="0">
+                <a:solidFill>
+                  <a:srgbClr val="ED7D31"/>
+                </a:solidFill>
+                <a:latin typeface="Lucida Sans Typewriter" panose="020B0509030504030204" pitchFamily="49" charset="0"/>
+                <a:ea typeface="ＭＳ Ｐゴシック" panose="020B0600070205080204" pitchFamily="34" charset="-128"/>
+              </a:rPr>
+              <a:t>: 'Sears Towers’</a:t>
+            </a:r>
+          </a:p>
+          <a:p>
+            <a:pPr marL="0" indent="0">
+              <a:lnSpc>
+                <a:spcPct val="80000"/>
+              </a:lnSpc>
+              <a:buNone/>
+            </a:pPr>
+            <a:endParaRPr lang="en-US" altLang="en-US" sz="1500" dirty="0">
+              <a:solidFill>
+                <a:srgbClr val="ED7D31"/>
+              </a:solidFill>
+              <a:latin typeface="Lucida Sans Typewriter" panose="020B0509030504030204" pitchFamily="49" charset="0"/>
+              <a:ea typeface="ＭＳ Ｐゴシック" panose="020B0600070205080204" pitchFamily="34" charset="-128"/>
+            </a:endParaRPr>
+          </a:p>
+          <a:p>
+            <a:pPr marL="0" indent="0">
+              <a:lnSpc>
+                <a:spcPct val="80000"/>
+              </a:lnSpc>
+              <a:buNone/>
+            </a:pPr>
+            <a:r>
+              <a:rPr lang="en-US" altLang="en-US" sz="1500" dirty="0">
+                <a:solidFill>
+                  <a:srgbClr val="ED7D31"/>
+                </a:solidFill>
+                <a:latin typeface="Lucida Sans Typewriter" panose="020B0509030504030204" pitchFamily="49" charset="0"/>
+                <a:ea typeface="ＭＳ Ｐゴシック" panose="020B0600070205080204" pitchFamily="34" charset="-128"/>
+              </a:rPr>
+              <a:t>&gt;&gt;&gt; </a:t>
+            </a:r>
+            <a:r>
+              <a:rPr lang="en-US" altLang="en-US" sz="1500" dirty="0" err="1">
+                <a:solidFill>
+                  <a:srgbClr val="ED7D31"/>
+                </a:solidFill>
+                <a:latin typeface="Lucida Sans Typewriter" panose="020B0509030504030204" pitchFamily="49" charset="0"/>
+                <a:ea typeface="ＭＳ Ｐゴシック" panose="020B0600070205080204" pitchFamily="34" charset="-128"/>
+              </a:rPr>
+              <a:t>height.get</a:t>
+            </a:r>
+            <a:r>
+              <a:rPr lang="en-US" altLang="en-US" sz="1500" dirty="0">
+                <a:solidFill>
+                  <a:srgbClr val="ED7D31"/>
+                </a:solidFill>
+                <a:latin typeface="Lucida Sans Typewriter" panose="020B0509030504030204" pitchFamily="49" charset="0"/>
+                <a:ea typeface="ＭＳ Ｐゴシック" panose="020B0600070205080204" pitchFamily="34" charset="-128"/>
+              </a:rPr>
+              <a:t>(‘Sears Tower’, -1)</a:t>
+            </a:r>
+          </a:p>
+          <a:p>
+            <a:pPr marL="0" indent="0">
+              <a:lnSpc>
+                <a:spcPct val="80000"/>
+              </a:lnSpc>
+              <a:buNone/>
+            </a:pPr>
+            <a:r>
+              <a:rPr lang="en-US" altLang="en-US" sz="1500" dirty="0">
+                <a:solidFill>
+                  <a:srgbClr val="ED7D31"/>
+                </a:solidFill>
+                <a:latin typeface="Lucida Sans Typewriter" panose="020B0509030504030204" pitchFamily="49" charset="0"/>
+                <a:ea typeface="ＭＳ Ｐゴシック" panose="020B0600070205080204" pitchFamily="34" charset="-128"/>
+              </a:rPr>
+              <a:t>-1</a:t>
+            </a:r>
+          </a:p>
+        </p:txBody>
+      </p:sp>
+    </p:spTree>
+    <p:extLst>
+      <p:ext uri="{BB962C8B-B14F-4D97-AF65-F5344CB8AC3E}">
+        <p14:creationId xmlns:p14="http://schemas.microsoft.com/office/powerpoint/2010/main" val="995528830"/>
+      </p:ext>
+    </p:extLst>
+  </p:cSld>
+  <p:clrMapOvr>
+    <a:masterClrMapping/>
+  </p:clrMapOvr>
+</p:sld>
+</file>
+
+<file path=ppt/slides/slide8.xml><?xml version="1.0" encoding="utf-8"?>
+<p:sld xmlns:a="http://schemas.openxmlformats.org/drawingml/2006/main" xmlns:r="http://schemas.openxmlformats.org/officeDocument/2006/relationships" xmlns:p="http://schemas.openxmlformats.org/presentationml/2006/main">
+  <p:cSld>
+    <p:spTree>
+      <p:nvGrpSpPr>
+        <p:cNvPr id="1" name=""/>
+        <p:cNvGrpSpPr/>
+        <p:nvPr/>
+      </p:nvGrpSpPr>
+      <p:grpSpPr>
+        <a:xfrm>
+          <a:off x="0" y="0"/>
+          <a:ext cx="0" cy="0"/>
+          <a:chOff x="0" y="0"/>
+          <a:chExt cx="0" cy="0"/>
+        </a:xfrm>
+      </p:grpSpPr>
+      <p:sp>
+        <p:nvSpPr>
+          <p:cNvPr id="2" name="Title 1">
+            <a:extLst>
+              <a:ext uri="{FF2B5EF4-FFF2-40B4-BE49-F238E27FC236}">
+                <a16:creationId xmlns:a16="http://schemas.microsoft.com/office/drawing/2014/main" id="{A3CF88B2-7D10-4512-B991-123D8BB60E9C}"/>
+              </a:ext>
+            </a:extLst>
+          </p:cNvPr>
+          <p:cNvSpPr>
+            <a:spLocks noGrp="1"/>
+          </p:cNvSpPr>
+          <p:nvPr>
+            <p:ph type="title"/>
+          </p:nvPr>
+        </p:nvSpPr>
+        <p:spPr>
+          <a:xfrm>
+            <a:off x="838200" y="365125"/>
+            <a:ext cx="10515600" cy="1325563"/>
+          </a:xfrm>
+        </p:spPr>
+        <p:txBody>
+          <a:bodyPr/>
+          <a:lstStyle/>
+          <a:p>
+            <a:r>
+              <a:rPr lang="en-US" dirty="0"/>
+              <a:t>Dictionaries</a:t>
+            </a:r>
+            <a:endParaRPr lang="en-US" dirty="0">
+              <a:latin typeface="Courier New" panose="02070309020205020404" pitchFamily="49" charset="0"/>
+              <a:cs typeface="Courier New" panose="02070309020205020404" pitchFamily="49" charset="0"/>
+            </a:endParaRPr>
+          </a:p>
+        </p:txBody>
+      </p:sp>
+      <p:sp>
+        <p:nvSpPr>
+          <p:cNvPr id="3" name="Content Placeholder 2">
+            <a:extLst>
+              <a:ext uri="{FF2B5EF4-FFF2-40B4-BE49-F238E27FC236}">
+                <a16:creationId xmlns:a16="http://schemas.microsoft.com/office/drawing/2014/main" id="{5F4835C5-2666-4F19-88FF-ACF2518A749F}"/>
+              </a:ext>
+            </a:extLst>
+          </p:cNvPr>
+          <p:cNvSpPr>
+            <a:spLocks noGrp="1"/>
+          </p:cNvSpPr>
+          <p:nvPr>
+            <p:ph idx="1"/>
+          </p:nvPr>
+        </p:nvSpPr>
+        <p:spPr>
+          <a:xfrm>
+            <a:off x="838199" y="2043739"/>
+            <a:ext cx="10738607" cy="3887278"/>
+          </a:xfrm>
+        </p:spPr>
+        <p:txBody>
+          <a:bodyPr>
+            <a:normAutofit/>
+          </a:bodyPr>
+          <a:lstStyle/>
+          <a:p>
+            <a:pPr marL="0" indent="0">
+              <a:lnSpc>
+                <a:spcPct val="80000"/>
+              </a:lnSpc>
+              <a:buNone/>
+            </a:pPr>
+            <a:r>
+              <a:rPr lang="en-US" altLang="en-US" sz="2300" dirty="0"/>
+              <a:t>A Dictionary is also an </a:t>
+            </a:r>
+            <a:r>
+              <a:rPr lang="en-US" altLang="en-US" sz="2300" i="1" dirty="0" err="1"/>
+              <a:t>iterable</a:t>
+            </a:r>
+            <a:r>
+              <a:rPr lang="en-US" altLang="en-US" sz="2300" dirty="0"/>
+              <a:t> that returns it’s keys, one by one (in no particular order)</a:t>
+            </a:r>
+          </a:p>
+          <a:p>
+            <a:pPr marL="0" indent="0">
+              <a:lnSpc>
+                <a:spcPct val="80000"/>
+              </a:lnSpc>
+              <a:buNone/>
+            </a:pPr>
+            <a:endParaRPr lang="en-US" altLang="en-US" sz="2300" dirty="0"/>
+          </a:p>
+          <a:p>
+            <a:pPr marL="0" lvl="0" indent="0">
+              <a:lnSpc>
+                <a:spcPct val="100000"/>
+              </a:lnSpc>
+              <a:buNone/>
+            </a:pPr>
+            <a:r>
+              <a:rPr lang="en-US" altLang="en-US" sz="1500" dirty="0">
+                <a:solidFill>
+                  <a:srgbClr val="ED7D31"/>
+                </a:solidFill>
+                <a:latin typeface="Lucida Sans Typewriter" panose="020B0509030504030204" pitchFamily="49" charset="0"/>
+                <a:ea typeface="ＭＳ Ｐゴシック" panose="020B0600070205080204" pitchFamily="34" charset="-128"/>
+              </a:rPr>
+              <a:t>&gt;&gt;&gt; for k in height:</a:t>
+            </a:r>
+          </a:p>
+          <a:p>
+            <a:pPr marL="0" lvl="0" indent="0">
+              <a:lnSpc>
+                <a:spcPct val="100000"/>
+              </a:lnSpc>
+              <a:buNone/>
+            </a:pPr>
+            <a:r>
+              <a:rPr lang="en-US" altLang="en-US" sz="1500" dirty="0">
+                <a:solidFill>
+                  <a:srgbClr val="ED7D31"/>
+                </a:solidFill>
+                <a:latin typeface="Lucida Sans Typewriter" panose="020B0509030504030204" pitchFamily="49" charset="0"/>
+                <a:ea typeface="ＭＳ Ｐゴシック" panose="020B0600070205080204" pitchFamily="34" charset="-128"/>
+              </a:rPr>
+              <a:t>...	print(k)</a:t>
+            </a:r>
+          </a:p>
+          <a:p>
+            <a:pPr marL="0" lvl="0" indent="0">
+              <a:lnSpc>
+                <a:spcPct val="100000"/>
+              </a:lnSpc>
+              <a:buNone/>
+            </a:pPr>
+            <a:r>
+              <a:rPr lang="en-US" altLang="en-US" sz="1500" dirty="0">
+                <a:solidFill>
+                  <a:srgbClr val="ED7D31"/>
+                </a:solidFill>
+                <a:latin typeface="Lucida Sans Typewriter" panose="020B0509030504030204" pitchFamily="49" charset="0"/>
+                <a:ea typeface="ＭＳ Ｐゴシック" panose="020B0600070205080204" pitchFamily="34" charset="-128"/>
+              </a:rPr>
+              <a:t>Burj Khalifa</a:t>
+            </a:r>
+          </a:p>
+          <a:p>
+            <a:pPr marL="0" lvl="0" indent="0">
+              <a:lnSpc>
+                <a:spcPct val="100000"/>
+              </a:lnSpc>
+              <a:buNone/>
+            </a:pPr>
+            <a:r>
+              <a:rPr lang="en-US" altLang="en-US" sz="1500" dirty="0">
+                <a:solidFill>
+                  <a:srgbClr val="ED7D31"/>
+                </a:solidFill>
+                <a:latin typeface="Lucida Sans Typewriter" panose="020B0509030504030204" pitchFamily="49" charset="0"/>
+                <a:ea typeface="ＭＳ Ｐゴシック" panose="020B0600070205080204" pitchFamily="34" charset="-128"/>
+              </a:rPr>
+              <a:t>Mercury City Tower</a:t>
+            </a:r>
+          </a:p>
+          <a:p>
+            <a:pPr marL="0" lvl="0" indent="0">
+              <a:lnSpc>
+                <a:spcPct val="100000"/>
+              </a:lnSpc>
+              <a:buNone/>
+            </a:pPr>
+            <a:r>
+              <a:rPr lang="en-US" altLang="en-US" sz="1500" dirty="0">
+                <a:solidFill>
+                  <a:srgbClr val="ED7D31"/>
+                </a:solidFill>
+                <a:latin typeface="Lucida Sans Typewriter" panose="020B0509030504030204" pitchFamily="49" charset="0"/>
+                <a:ea typeface="ＭＳ Ｐゴシック" panose="020B0600070205080204" pitchFamily="34" charset="-128"/>
+              </a:rPr>
+              <a:t>Empire State Building</a:t>
+            </a:r>
+          </a:p>
+          <a:p>
+            <a:pPr marL="0" lvl="0" indent="0">
+              <a:lnSpc>
+                <a:spcPct val="100000"/>
+              </a:lnSpc>
+              <a:buNone/>
+            </a:pPr>
+            <a:r>
+              <a:rPr lang="en-US" altLang="en-US" sz="1500" dirty="0">
+                <a:solidFill>
+                  <a:srgbClr val="ED7D31"/>
+                </a:solidFill>
+                <a:latin typeface="Lucida Sans Typewriter" panose="020B0509030504030204" pitchFamily="49" charset="0"/>
+                <a:ea typeface="ＭＳ Ｐゴシック" panose="020B0600070205080204" pitchFamily="34" charset="-128"/>
+              </a:rPr>
+              <a:t>One World Trade Center</a:t>
+            </a:r>
+          </a:p>
+        </p:txBody>
+      </p:sp>
+    </p:spTree>
+    <p:extLst>
+      <p:ext uri="{BB962C8B-B14F-4D97-AF65-F5344CB8AC3E}">
+        <p14:creationId xmlns:p14="http://schemas.microsoft.com/office/powerpoint/2010/main" val="2717198226"/>
+      </p:ext>
+    </p:extLst>
+  </p:cSld>
+  <p:clrMapOvr>
+    <a:masterClrMapping/>
+  </p:clrMapOvr>
+</p:sld>
+</file>
+
+<file path=ppt/slides/slide9.xml><?xml version="1.0" encoding="utf-8"?>
+<p:sld xmlns:a="http://schemas.openxmlformats.org/drawingml/2006/main" xmlns:r="http://schemas.openxmlformats.org/officeDocument/2006/relationships" xmlns:p="http://schemas.openxmlformats.org/presentationml/2006/main">
+  <p:cSld>
+    <p:spTree>
+      <p:nvGrpSpPr>
+        <p:cNvPr id="1" name=""/>
+        <p:cNvGrpSpPr/>
+        <p:nvPr/>
+      </p:nvGrpSpPr>
+      <p:grpSpPr>
+        <a:xfrm>
+          <a:off x="0" y="0"/>
+          <a:ext cx="0" cy="0"/>
+          <a:chOff x="0" y="0"/>
+          <a:chExt cx="0" cy="0"/>
+        </a:xfrm>
+      </p:grpSpPr>
+      <p:sp>
+        <p:nvSpPr>
+          <p:cNvPr id="2" name="Title 1">
+            <a:extLst>
+              <a:ext uri="{FF2B5EF4-FFF2-40B4-BE49-F238E27FC236}">
+                <a16:creationId xmlns:a16="http://schemas.microsoft.com/office/drawing/2014/main" id="{A3CF88B2-7D10-4512-B991-123D8BB60E9C}"/>
+              </a:ext>
+            </a:extLst>
+          </p:cNvPr>
+          <p:cNvSpPr>
+            <a:spLocks noGrp="1"/>
+          </p:cNvSpPr>
+          <p:nvPr>
+            <p:ph type="title"/>
+          </p:nvPr>
+        </p:nvSpPr>
+        <p:spPr>
+          <a:xfrm>
+            <a:off x="838200" y="365125"/>
+            <a:ext cx="10515600" cy="1325563"/>
+          </a:xfrm>
+        </p:spPr>
+        <p:txBody>
+          <a:bodyPr/>
+          <a:lstStyle/>
+          <a:p>
+            <a:r>
+              <a:rPr lang="en-US" dirty="0"/>
+              <a:t>Dictionaries</a:t>
+            </a:r>
+            <a:endParaRPr lang="en-US" dirty="0">
+              <a:latin typeface="Courier New" panose="02070309020205020404" pitchFamily="49" charset="0"/>
+              <a:cs typeface="Courier New" panose="02070309020205020404" pitchFamily="49" charset="0"/>
+            </a:endParaRPr>
+          </a:p>
+        </p:txBody>
+      </p:sp>
+      <p:sp>
+        <p:nvSpPr>
+          <p:cNvPr id="3" name="Content Placeholder 2">
+            <a:extLst>
+              <a:ext uri="{FF2B5EF4-FFF2-40B4-BE49-F238E27FC236}">
+                <a16:creationId xmlns:a16="http://schemas.microsoft.com/office/drawing/2014/main" id="{5F4835C5-2666-4F19-88FF-ACF2518A749F}"/>
+              </a:ext>
+            </a:extLst>
+          </p:cNvPr>
+          <p:cNvSpPr>
+            <a:spLocks noGrp="1"/>
+          </p:cNvSpPr>
+          <p:nvPr>
+            <p:ph idx="1"/>
+          </p:nvPr>
+        </p:nvSpPr>
+        <p:spPr>
+          <a:xfrm>
+            <a:off x="838199" y="2043739"/>
+            <a:ext cx="10738607" cy="3887278"/>
+          </a:xfrm>
+        </p:spPr>
+        <p:txBody>
+          <a:bodyPr>
+            <a:normAutofit fontScale="92500" lnSpcReduction="20000"/>
+          </a:bodyPr>
+          <a:lstStyle/>
+          <a:p>
+            <a:pPr marL="0" indent="0">
+              <a:lnSpc>
+                <a:spcPct val="80000"/>
+              </a:lnSpc>
+              <a:buNone/>
+            </a:pPr>
+            <a:r>
+              <a:rPr lang="en-US" altLang="en-US" sz="2300" dirty="0"/>
+              <a:t>Print all buildings in our dictionary along with their heights:</a:t>
+            </a:r>
+          </a:p>
+          <a:p>
+            <a:pPr marL="0" indent="0">
+              <a:lnSpc>
+                <a:spcPct val="80000"/>
+              </a:lnSpc>
+              <a:buNone/>
+            </a:pPr>
+            <a:endParaRPr lang="en-US" altLang="en-US" sz="2300" dirty="0"/>
+          </a:p>
+          <a:p>
+            <a:pPr marL="0" lvl="0" indent="0">
+              <a:lnSpc>
+                <a:spcPct val="100000"/>
+              </a:lnSpc>
+              <a:buNone/>
+            </a:pPr>
+            <a:r>
+              <a:rPr lang="en-US" altLang="en-US" sz="1500" dirty="0">
+                <a:solidFill>
+                  <a:srgbClr val="ED7D31"/>
+                </a:solidFill>
+                <a:latin typeface="Lucida Sans Typewriter" panose="020B0509030504030204" pitchFamily="49" charset="0"/>
+                <a:ea typeface="ＭＳ Ｐゴシック" panose="020B0600070205080204" pitchFamily="34" charset="-128"/>
+              </a:rPr>
+              <a:t>&gt;&gt;&gt; for k in height:</a:t>
+            </a:r>
+          </a:p>
+          <a:p>
+            <a:pPr marL="0" lvl="0" indent="0">
+              <a:lnSpc>
+                <a:spcPct val="100000"/>
+              </a:lnSpc>
+              <a:buNone/>
+            </a:pPr>
+            <a:r>
+              <a:rPr lang="en-US" altLang="en-US" sz="1500" dirty="0">
+                <a:solidFill>
+                  <a:srgbClr val="ED7D31"/>
+                </a:solidFill>
+                <a:latin typeface="Lucida Sans Typewriter" panose="020B0509030504030204" pitchFamily="49" charset="0"/>
+                <a:ea typeface="ＭＳ Ｐゴシック" panose="020B0600070205080204" pitchFamily="34" charset="-128"/>
+              </a:rPr>
+              <a:t>...	print(k, height[k])</a:t>
+            </a:r>
+          </a:p>
+          <a:p>
+            <a:pPr marL="0" lvl="0" indent="0">
+              <a:lnSpc>
+                <a:spcPct val="100000"/>
+              </a:lnSpc>
+              <a:buNone/>
+            </a:pPr>
+            <a:r>
+              <a:rPr lang="en-US" altLang="en-US" sz="1500" dirty="0">
+                <a:solidFill>
+                  <a:srgbClr val="ED7D31"/>
+                </a:solidFill>
+                <a:latin typeface="Lucida Sans Typewriter" panose="020B0509030504030204" pitchFamily="49" charset="0"/>
+                <a:ea typeface="ＭＳ Ｐゴシック" panose="020B0600070205080204" pitchFamily="34" charset="-128"/>
+              </a:rPr>
+              <a:t>Burj Khalifa 828.0</a:t>
+            </a:r>
+          </a:p>
+          <a:p>
+            <a:pPr marL="0" lvl="0" indent="0">
+              <a:lnSpc>
+                <a:spcPct val="100000"/>
+              </a:lnSpc>
+              <a:buNone/>
+            </a:pPr>
+            <a:r>
+              <a:rPr lang="en-US" altLang="en-US" sz="1500" dirty="0">
+                <a:solidFill>
+                  <a:srgbClr val="ED7D31"/>
+                </a:solidFill>
+                <a:latin typeface="Lucida Sans Typewriter" panose="020B0509030504030204" pitchFamily="49" charset="0"/>
+                <a:ea typeface="ＭＳ Ｐゴシック" panose="020B0600070205080204" pitchFamily="34" charset="-128"/>
+              </a:rPr>
+              <a:t>Mercury City Tower 339.0</a:t>
+            </a:r>
+          </a:p>
+          <a:p>
+            <a:pPr marL="0" lvl="0" indent="0">
+              <a:lnSpc>
+                <a:spcPct val="100000"/>
+              </a:lnSpc>
+              <a:buNone/>
+            </a:pPr>
+            <a:r>
+              <a:rPr lang="en-US" altLang="en-US" sz="1500" dirty="0">
+                <a:solidFill>
+                  <a:srgbClr val="ED7D31"/>
+                </a:solidFill>
+                <a:latin typeface="Lucida Sans Typewriter" panose="020B0509030504030204" pitchFamily="49" charset="0"/>
+                <a:ea typeface="ＭＳ Ｐゴシック" panose="020B0600070205080204" pitchFamily="34" charset="-128"/>
+              </a:rPr>
+              <a:t>Empire State Building 381.0</a:t>
+            </a:r>
+          </a:p>
+          <a:p>
+            <a:pPr marL="0" lvl="0" indent="0">
+              <a:lnSpc>
+                <a:spcPct val="100000"/>
+              </a:lnSpc>
+              <a:buNone/>
+            </a:pPr>
+            <a:r>
+              <a:rPr lang="en-US" altLang="en-US" sz="1500" dirty="0">
+                <a:solidFill>
+                  <a:srgbClr val="ED7D31"/>
+                </a:solidFill>
+                <a:latin typeface="Lucida Sans Typewriter" panose="020B0509030504030204" pitchFamily="49" charset="0"/>
+                <a:ea typeface="ＭＳ Ｐゴシック" panose="020B0600070205080204" pitchFamily="34" charset="-128"/>
+              </a:rPr>
+              <a:t>One World Trade Center 541.3</a:t>
+            </a:r>
+          </a:p>
+          <a:p>
+            <a:pPr marL="0" lvl="0" indent="0">
+              <a:lnSpc>
+                <a:spcPct val="100000"/>
+              </a:lnSpc>
+              <a:buNone/>
+            </a:pPr>
+            <a:endParaRPr lang="en-US" altLang="en-US" sz="1500" dirty="0">
+              <a:solidFill>
+                <a:srgbClr val="ED7D31"/>
+              </a:solidFill>
+              <a:latin typeface="Lucida Sans Typewriter" panose="020B0509030504030204" pitchFamily="49" charset="0"/>
+              <a:ea typeface="ＭＳ Ｐゴシック" panose="020B0600070205080204" pitchFamily="34" charset="-128"/>
+            </a:endParaRPr>
+          </a:p>
+          <a:p>
+            <a:pPr marL="0" lvl="0" indent="0">
+              <a:lnSpc>
+                <a:spcPct val="100000"/>
+              </a:lnSpc>
+              <a:buNone/>
+            </a:pPr>
+            <a:r>
+              <a:rPr lang="en-US" altLang="en-US" sz="2300" dirty="0"/>
+              <a:t>We can be explicit and ask a dictionary for it’s </a:t>
+            </a:r>
+            <a:r>
+              <a:rPr lang="en-US" altLang="en-US" sz="2300" i="1" dirty="0"/>
+              <a:t>keys</a:t>
+            </a:r>
+            <a:r>
+              <a:rPr lang="en-US" altLang="en-US" sz="2300" dirty="0"/>
+              <a:t>:</a:t>
+            </a:r>
+          </a:p>
+          <a:p>
+            <a:pPr marL="0" lvl="0" indent="0">
+              <a:lnSpc>
+                <a:spcPct val="100000"/>
+              </a:lnSpc>
+              <a:buNone/>
+            </a:pPr>
+            <a:r>
+              <a:rPr lang="en-US" altLang="en-US" sz="1500" dirty="0">
+                <a:solidFill>
+                  <a:srgbClr val="ED7D31"/>
+                </a:solidFill>
+                <a:latin typeface="Lucida Sans Typewriter" panose="020B0509030504030204" pitchFamily="49" charset="0"/>
+                <a:ea typeface="ＭＳ Ｐゴシック" panose="020B0600070205080204" pitchFamily="34" charset="-128"/>
+              </a:rPr>
+              <a:t>&gt;&gt;&gt; for k in </a:t>
+            </a:r>
+            <a:r>
+              <a:rPr lang="en-US" altLang="en-US" sz="1500" dirty="0" err="1">
+                <a:solidFill>
+                  <a:srgbClr val="ED7D31"/>
+                </a:solidFill>
+                <a:latin typeface="Lucida Sans Typewriter" panose="020B0509030504030204" pitchFamily="49" charset="0"/>
+                <a:ea typeface="ＭＳ Ｐゴシック" panose="020B0600070205080204" pitchFamily="34" charset="-128"/>
+              </a:rPr>
+              <a:t>height.keys</a:t>
+            </a:r>
+            <a:r>
+              <a:rPr lang="en-US" altLang="en-US" sz="1500" dirty="0">
+                <a:solidFill>
+                  <a:srgbClr val="ED7D31"/>
+                </a:solidFill>
+                <a:latin typeface="Lucida Sans Typewriter" panose="020B0509030504030204" pitchFamily="49" charset="0"/>
+                <a:ea typeface="ＭＳ Ｐゴシック" panose="020B0600070205080204" pitchFamily="34" charset="-128"/>
+              </a:rPr>
+              <a:t>():</a:t>
+            </a:r>
+          </a:p>
+          <a:p>
+            <a:pPr marL="0" lvl="0" indent="0">
+              <a:lnSpc>
+                <a:spcPct val="100000"/>
+              </a:lnSpc>
+              <a:buNone/>
+            </a:pPr>
+            <a:r>
+              <a:rPr lang="en-US" altLang="en-US" sz="1500" dirty="0">
+                <a:solidFill>
+                  <a:srgbClr val="ED7D31"/>
+                </a:solidFill>
+                <a:latin typeface="Lucida Sans Typewriter" panose="020B0509030504030204" pitchFamily="49" charset="0"/>
+                <a:ea typeface="ＭＳ Ｐゴシック" panose="020B0600070205080204" pitchFamily="34" charset="-128"/>
+              </a:rPr>
+              <a:t>...	print(k, height[k])</a:t>
+            </a:r>
+          </a:p>
+          <a:p>
+            <a:pPr marL="0" lvl="0" indent="0">
+              <a:lnSpc>
+                <a:spcPct val="100000"/>
+              </a:lnSpc>
+              <a:buNone/>
+            </a:pPr>
+            <a:endParaRPr lang="en-US" altLang="en-US" sz="2300" dirty="0"/>
+          </a:p>
+        </p:txBody>
+      </p:sp>
+    </p:spTree>
+    <p:extLst>
+      <p:ext uri="{BB962C8B-B14F-4D97-AF65-F5344CB8AC3E}">
+        <p14:creationId xmlns:p14="http://schemas.microsoft.com/office/powerpoint/2010/main" val="3201658168"/>
       </p:ext>
     </p:extLst>
   </p:cSld>

</xml_diff>